<commit_message>
Update images and section headers
Revised presentation with updated images and improved section headers.

Co-Authored-By: Claude Sonnet 4.5 <noreply@anthropic.com>
</commit_message>
<xml_diff>
--- a/Agentic_Threat_Intel/2026-01-21_Agentic-Threat-Intel-Presentation.pptx
+++ b/Agentic_Threat_Intel/2026-01-21_Agentic-Threat-Intel-Presentation.pptx
@@ -12,33 +12,32 @@
     <p:sldId id="258" r:id="rId6"/>
     <p:sldId id="257" r:id="rId7"/>
     <p:sldId id="260" r:id="rId8"/>
-    <p:sldId id="259" r:id="rId9"/>
-    <p:sldId id="261" r:id="rId10"/>
-    <p:sldId id="287" r:id="rId11"/>
-    <p:sldId id="288" r:id="rId12"/>
-    <p:sldId id="289" r:id="rId13"/>
-    <p:sldId id="290" r:id="rId14"/>
-    <p:sldId id="286" r:id="rId15"/>
-    <p:sldId id="262" r:id="rId16"/>
-    <p:sldId id="284" r:id="rId17"/>
-    <p:sldId id="264" r:id="rId18"/>
-    <p:sldId id="265" r:id="rId19"/>
-    <p:sldId id="266" r:id="rId20"/>
-    <p:sldId id="283" r:id="rId21"/>
-    <p:sldId id="267" r:id="rId22"/>
-    <p:sldId id="269" r:id="rId23"/>
-    <p:sldId id="281" r:id="rId24"/>
-    <p:sldId id="270" r:id="rId25"/>
-    <p:sldId id="271" r:id="rId26"/>
-    <p:sldId id="272" r:id="rId27"/>
-    <p:sldId id="273" r:id="rId28"/>
-    <p:sldId id="274" r:id="rId29"/>
-    <p:sldId id="277" r:id="rId30"/>
-    <p:sldId id="275" r:id="rId31"/>
-    <p:sldId id="276" r:id="rId32"/>
-    <p:sldId id="278" r:id="rId33"/>
-    <p:sldId id="279" r:id="rId34"/>
-    <p:sldId id="280" r:id="rId35"/>
+    <p:sldId id="261" r:id="rId9"/>
+    <p:sldId id="287" r:id="rId10"/>
+    <p:sldId id="288" r:id="rId11"/>
+    <p:sldId id="289" r:id="rId12"/>
+    <p:sldId id="290" r:id="rId13"/>
+    <p:sldId id="286" r:id="rId14"/>
+    <p:sldId id="262" r:id="rId15"/>
+    <p:sldId id="284" r:id="rId16"/>
+    <p:sldId id="264" r:id="rId17"/>
+    <p:sldId id="265" r:id="rId18"/>
+    <p:sldId id="266" r:id="rId19"/>
+    <p:sldId id="283" r:id="rId20"/>
+    <p:sldId id="267" r:id="rId21"/>
+    <p:sldId id="269" r:id="rId22"/>
+    <p:sldId id="281" r:id="rId23"/>
+    <p:sldId id="270" r:id="rId24"/>
+    <p:sldId id="271" r:id="rId25"/>
+    <p:sldId id="272" r:id="rId26"/>
+    <p:sldId id="273" r:id="rId27"/>
+    <p:sldId id="274" r:id="rId28"/>
+    <p:sldId id="277" r:id="rId29"/>
+    <p:sldId id="275" r:id="rId30"/>
+    <p:sldId id="276" r:id="rId31"/>
+    <p:sldId id="278" r:id="rId32"/>
+    <p:sldId id="279" r:id="rId33"/>
+    <p:sldId id="280" r:id="rId34"/>
   </p:sldIdLst>
   <p:sldSz cx="12192000" cy="6858000"/>
   <p:notesSz cx="6858000" cy="9144000"/>
@@ -137,6 +136,11 @@
       </a:defRPr>
     </a:lvl9pPr>
   </p:defaultTextStyle>
+  <p:extLst>
+    <p:ext uri="{EFAFB233-063F-42B5-8137-9DF3F51BA10A}">
+      <p15:sldGuideLst xmlns:p15="http://schemas.microsoft.com/office/powerpoint/2012/main"/>
+    </p:ext>
+  </p:extLst>
 </p:presentation>
 </file>
 
@@ -3450,87 +3454,6 @@
         <p:cNvPr id="1" name="">
           <a:extLst>
             <a:ext uri="{FF2B5EF4-FFF2-40B4-BE49-F238E27FC236}">
-              <a16:creationId xmlns:a16="http://schemas.microsoft.com/office/drawing/2014/main" id="{C9D6A0D5-C35A-E0CF-1111-A3621EC633CD}"/>
-            </a:ext>
-          </a:extLst>
-        </p:cNvPr>
-        <p:cNvGrpSpPr/>
-        <p:nvPr/>
-      </p:nvGrpSpPr>
-      <p:grpSpPr>
-        <a:xfrm>
-          <a:off x="0" y="0"/>
-          <a:ext cx="0" cy="0"/>
-          <a:chOff x="0" y="0"/>
-          <a:chExt cx="0" cy="0"/>
-        </a:xfrm>
-      </p:grpSpPr>
-      <p:sp>
-        <p:nvSpPr>
-          <p:cNvPr id="2" name="Title 1">
-            <a:extLst>
-              <a:ext uri="{FF2B5EF4-FFF2-40B4-BE49-F238E27FC236}">
-                <a16:creationId xmlns:a16="http://schemas.microsoft.com/office/drawing/2014/main" id="{02E84A37-4069-093C-5790-996E9EBFF7D3}"/>
-              </a:ext>
-            </a:extLst>
-          </p:cNvPr>
-          <p:cNvSpPr>
-            <a:spLocks noGrp="1"/>
-          </p:cNvSpPr>
-          <p:nvPr>
-            <p:ph type="ctrTitle"/>
-          </p:nvPr>
-        </p:nvSpPr>
-        <p:spPr>
-          <a:xfrm>
-            <a:off x="1524000" y="2743200"/>
-            <a:ext cx="9144000" cy="1193800"/>
-          </a:xfrm>
-        </p:spPr>
-        <p:txBody>
-          <a:bodyPr/>
-          <a:lstStyle/>
-          <a:p>
-            <a:r>
-              <a:rPr lang="en-US" dirty="0">
-                <a:solidFill>
-                  <a:srgbClr val="282828"/>
-                </a:solidFill>
-              </a:rPr>
-              <a:t>The system is empowered:</a:t>
-            </a:r>
-          </a:p>
-        </p:txBody>
-      </p:sp>
-    </p:spTree>
-    <p:extLst>
-      <p:ext uri="{BB962C8B-B14F-4D97-AF65-F5344CB8AC3E}">
-        <p14:creationId xmlns:p14="http://schemas.microsoft.com/office/powerpoint/2010/main" val="3096382915"/>
-      </p:ext>
-    </p:extLst>
-  </p:cSld>
-  <p:clrMapOvr>
-    <a:masterClrMapping/>
-  </p:clrMapOvr>
-</p:sld>
-</file>
-
-<file path=ppt/slides/slide11.xml><?xml version="1.0" encoding="utf-8"?>
-<p:sld xmlns:a="http://schemas.openxmlformats.org/drawingml/2006/main" xmlns:r="http://schemas.openxmlformats.org/officeDocument/2006/relationships" xmlns:p="http://schemas.openxmlformats.org/presentationml/2006/main">
-  <p:cSld>
-    <p:bg>
-      <p:bgPr>
-        <a:solidFill>
-          <a:srgbClr val="EBDCB3"/>
-        </a:solidFill>
-        <a:effectLst/>
-      </p:bgPr>
-    </p:bg>
-    <p:spTree>
-      <p:nvGrpSpPr>
-        <p:cNvPr id="1" name="">
-          <a:extLst>
-            <a:ext uri="{FF2B5EF4-FFF2-40B4-BE49-F238E27FC236}">
               <a16:creationId xmlns:a16="http://schemas.microsoft.com/office/drawing/2014/main" id="{469B0A6F-85C7-948A-36BE-07842271E24E}"/>
             </a:ext>
           </a:extLst>
@@ -3613,7 +3536,7 @@
 </p:sld>
 </file>
 
-<file path=ppt/slides/slide12.xml><?xml version="1.0" encoding="utf-8"?>
+<file path=ppt/slides/slide11.xml><?xml version="1.0" encoding="utf-8"?>
 <p:sld xmlns:a="http://schemas.openxmlformats.org/drawingml/2006/main" xmlns:r="http://schemas.openxmlformats.org/officeDocument/2006/relationships" xmlns:p="http://schemas.openxmlformats.org/presentationml/2006/main">
   <p:cSld>
     <p:bg>
@@ -3696,7 +3619,7 @@
 </p:sld>
 </file>
 
-<file path=ppt/slides/slide13.xml><?xml version="1.0" encoding="utf-8"?>
+<file path=ppt/slides/slide12.xml><?xml version="1.0" encoding="utf-8"?>
 <p:sld xmlns:a="http://schemas.openxmlformats.org/drawingml/2006/main" xmlns:r="http://schemas.openxmlformats.org/officeDocument/2006/relationships" xmlns:p="http://schemas.openxmlformats.org/presentationml/2006/main">
   <p:cSld>
     <p:bg>
@@ -3787,7 +3710,7 @@
 </p:sld>
 </file>
 
-<file path=ppt/slides/slide14.xml><?xml version="1.0" encoding="utf-8"?>
+<file path=ppt/slides/slide13.xml><?xml version="1.0" encoding="utf-8"?>
 <p:sld xmlns:a="http://schemas.openxmlformats.org/drawingml/2006/main" xmlns:r="http://schemas.openxmlformats.org/officeDocument/2006/relationships" xmlns:p="http://schemas.openxmlformats.org/presentationml/2006/main">
   <p:cSld>
     <p:bg>
@@ -3876,7 +3799,7 @@
 </p:sld>
 </file>
 
-<file path=ppt/slides/slide15.xml><?xml version="1.0" encoding="utf-8"?>
+<file path=ppt/slides/slide14.xml><?xml version="1.0" encoding="utf-8"?>
 <p:sld xmlns:a="http://schemas.openxmlformats.org/drawingml/2006/main" xmlns:r="http://schemas.openxmlformats.org/officeDocument/2006/relationships" xmlns:p="http://schemas.openxmlformats.org/presentationml/2006/main">
   <p:cSld>
     <p:spTree>
@@ -3942,7 +3865,7 @@
 </p:sld>
 </file>
 
-<file path=ppt/slides/slide16.xml><?xml version="1.0" encoding="utf-8"?>
+<file path=ppt/slides/slide15.xml><?xml version="1.0" encoding="utf-8"?>
 <p:sld xmlns:a="http://schemas.openxmlformats.org/drawingml/2006/main" xmlns:r="http://schemas.openxmlformats.org/officeDocument/2006/relationships" xmlns:p="http://schemas.openxmlformats.org/presentationml/2006/main">
   <p:cSld>
     <p:spTree>
@@ -4008,7 +3931,7 @@
 </p:sld>
 </file>
 
-<file path=ppt/slides/slide17.xml><?xml version="1.0" encoding="utf-8"?>
+<file path=ppt/slides/slide16.xml><?xml version="1.0" encoding="utf-8"?>
 <p:sld xmlns:a="http://schemas.openxmlformats.org/drawingml/2006/main" xmlns:r="http://schemas.openxmlformats.org/officeDocument/2006/relationships" xmlns:p="http://schemas.openxmlformats.org/presentationml/2006/main">
   <p:cSld>
     <p:spTree>
@@ -4074,7 +3997,7 @@
 </p:sld>
 </file>
 
-<file path=ppt/slides/slide18.xml><?xml version="1.0" encoding="utf-8"?>
+<file path=ppt/slides/slide17.xml><?xml version="1.0" encoding="utf-8"?>
 <p:sld xmlns:a="http://schemas.openxmlformats.org/drawingml/2006/main" xmlns:r="http://schemas.openxmlformats.org/officeDocument/2006/relationships" xmlns:p="http://schemas.openxmlformats.org/presentationml/2006/main">
   <p:cSld>
     <p:spTree>
@@ -4140,7 +4063,7 @@
 </p:sld>
 </file>
 
-<file path=ppt/slides/slide19.xml><?xml version="1.0" encoding="utf-8"?>
+<file path=ppt/slides/slide18.xml><?xml version="1.0" encoding="utf-8"?>
 <p:sld xmlns:a="http://schemas.openxmlformats.org/drawingml/2006/main" xmlns:r="http://schemas.openxmlformats.org/officeDocument/2006/relationships" xmlns:p="http://schemas.openxmlformats.org/presentationml/2006/main">
   <p:cSld>
     <p:spTree>
@@ -4197,6 +4120,80 @@
     <p:extLst>
       <p:ext uri="{BB962C8B-B14F-4D97-AF65-F5344CB8AC3E}">
         <p14:creationId xmlns:p14="http://schemas.microsoft.com/office/powerpoint/2010/main" val="1961246669"/>
+      </p:ext>
+    </p:extLst>
+  </p:cSld>
+  <p:clrMapOvr>
+    <a:masterClrMapping/>
+  </p:clrMapOvr>
+</p:sld>
+</file>
+
+<file path=ppt/slides/slide19.xml><?xml version="1.0" encoding="utf-8"?>
+<p:sld xmlns:a="http://schemas.openxmlformats.org/drawingml/2006/main" xmlns:r="http://schemas.openxmlformats.org/officeDocument/2006/relationships" xmlns:p="http://schemas.openxmlformats.org/presentationml/2006/main">
+  <p:cSld>
+    <p:bg>
+      <p:bgPr>
+        <a:solidFill>
+          <a:srgbClr val="EBDCB3"/>
+        </a:solidFill>
+        <a:effectLst/>
+      </p:bgPr>
+    </p:bg>
+    <p:spTree>
+      <p:nvGrpSpPr>
+        <p:cNvPr id="1" name="">
+          <a:extLst>
+            <a:ext uri="{FF2B5EF4-FFF2-40B4-BE49-F238E27FC236}">
+              <a16:creationId xmlns:a16="http://schemas.microsoft.com/office/drawing/2014/main" id="{287D27F1-BA2B-9DC8-FB13-4D838D86FC9E}"/>
+            </a:ext>
+          </a:extLst>
+        </p:cNvPr>
+        <p:cNvGrpSpPr/>
+        <p:nvPr/>
+      </p:nvGrpSpPr>
+      <p:grpSpPr>
+        <a:xfrm>
+          <a:off x="0" y="0"/>
+          <a:ext cx="0" cy="0"/>
+          <a:chOff x="0" y="0"/>
+          <a:chExt cx="0" cy="0"/>
+        </a:xfrm>
+      </p:grpSpPr>
+      <p:pic>
+        <p:nvPicPr>
+          <p:cNvPr id="4" name="Picture 3">
+            <a:extLst>
+              <a:ext uri="{FF2B5EF4-FFF2-40B4-BE49-F238E27FC236}">
+                <a16:creationId xmlns:a16="http://schemas.microsoft.com/office/drawing/2014/main" id="{64993CD1-9FCF-0A2E-D842-73983F1BBB56}"/>
+              </a:ext>
+            </a:extLst>
+          </p:cNvPr>
+          <p:cNvPicPr>
+            <a:picLocks noChangeAspect="1"/>
+          </p:cNvPicPr>
+          <p:nvPr/>
+        </p:nvPicPr>
+        <p:blipFill>
+          <a:blip r:embed="rId2"/>
+          <a:stretch>
+            <a:fillRect/>
+          </a:stretch>
+        </p:blipFill>
+        <p:spPr>
+          <a:xfrm>
+            <a:off x="3068404" y="128297"/>
+            <a:ext cx="6055191" cy="6601406"/>
+          </a:xfrm>
+          <a:prstGeom prst="rect">
+            <a:avLst/>
+          </a:prstGeom>
+        </p:spPr>
+      </p:pic>
+    </p:spTree>
+    <p:extLst>
+      <p:ext uri="{BB962C8B-B14F-4D97-AF65-F5344CB8AC3E}">
+        <p14:creationId xmlns:p14="http://schemas.microsoft.com/office/powerpoint/2010/main" val="1410814769"/>
       </p:ext>
     </p:extLst>
   </p:cSld>
@@ -4343,10 +4340,10 @@
       </p:sp>
       <p:pic>
         <p:nvPicPr>
-          <p:cNvPr id="8" name="Picture 7">
-            <a:extLst>
-              <a:ext uri="{FF2B5EF4-FFF2-40B4-BE49-F238E27FC236}">
-                <a16:creationId xmlns:a16="http://schemas.microsoft.com/office/drawing/2014/main" id="{87E34D80-6310-0614-0711-C00EE9DFDEF4}"/>
+          <p:cNvPr id="3" name="Picture 2" descr="A logo with a black background&#10;&#10;AI-generated content may be incorrect.">
+            <a:extLst>
+              <a:ext uri="{FF2B5EF4-FFF2-40B4-BE49-F238E27FC236}">
+                <a16:creationId xmlns:a16="http://schemas.microsoft.com/office/drawing/2014/main" id="{B94C4240-067C-A208-4F96-6693E5BBA10A}"/>
               </a:ext>
             </a:extLst>
           </p:cNvPr>
@@ -4363,8 +4360,8 @@
         </p:blipFill>
         <p:spPr>
           <a:xfrm>
-            <a:off x="2955876" y="2029597"/>
-            <a:ext cx="6280248" cy="2798806"/>
+            <a:off x="923570" y="544979"/>
+            <a:ext cx="10344859" cy="5768042"/>
           </a:xfrm>
           <a:prstGeom prst="rect">
             <a:avLst/>
@@ -4385,80 +4382,6 @@
 </file>
 
 <file path=ppt/slides/slide20.xml><?xml version="1.0" encoding="utf-8"?>
-<p:sld xmlns:a="http://schemas.openxmlformats.org/drawingml/2006/main" xmlns:r="http://schemas.openxmlformats.org/officeDocument/2006/relationships" xmlns:p="http://schemas.openxmlformats.org/presentationml/2006/main">
-  <p:cSld>
-    <p:bg>
-      <p:bgPr>
-        <a:solidFill>
-          <a:srgbClr val="EBDCB3"/>
-        </a:solidFill>
-        <a:effectLst/>
-      </p:bgPr>
-    </p:bg>
-    <p:spTree>
-      <p:nvGrpSpPr>
-        <p:cNvPr id="1" name="">
-          <a:extLst>
-            <a:ext uri="{FF2B5EF4-FFF2-40B4-BE49-F238E27FC236}">
-              <a16:creationId xmlns:a16="http://schemas.microsoft.com/office/drawing/2014/main" id="{287D27F1-BA2B-9DC8-FB13-4D838D86FC9E}"/>
-            </a:ext>
-          </a:extLst>
-        </p:cNvPr>
-        <p:cNvGrpSpPr/>
-        <p:nvPr/>
-      </p:nvGrpSpPr>
-      <p:grpSpPr>
-        <a:xfrm>
-          <a:off x="0" y="0"/>
-          <a:ext cx="0" cy="0"/>
-          <a:chOff x="0" y="0"/>
-          <a:chExt cx="0" cy="0"/>
-        </a:xfrm>
-      </p:grpSpPr>
-      <p:pic>
-        <p:nvPicPr>
-          <p:cNvPr id="4" name="Picture 3">
-            <a:extLst>
-              <a:ext uri="{FF2B5EF4-FFF2-40B4-BE49-F238E27FC236}">
-                <a16:creationId xmlns:a16="http://schemas.microsoft.com/office/drawing/2014/main" id="{64993CD1-9FCF-0A2E-D842-73983F1BBB56}"/>
-              </a:ext>
-            </a:extLst>
-          </p:cNvPr>
-          <p:cNvPicPr>
-            <a:picLocks noChangeAspect="1"/>
-          </p:cNvPicPr>
-          <p:nvPr/>
-        </p:nvPicPr>
-        <p:blipFill>
-          <a:blip r:embed="rId2"/>
-          <a:stretch>
-            <a:fillRect/>
-          </a:stretch>
-        </p:blipFill>
-        <p:spPr>
-          <a:xfrm>
-            <a:off x="3068404" y="128297"/>
-            <a:ext cx="6055191" cy="6601406"/>
-          </a:xfrm>
-          <a:prstGeom prst="rect">
-            <a:avLst/>
-          </a:prstGeom>
-        </p:spPr>
-      </p:pic>
-    </p:spTree>
-    <p:extLst>
-      <p:ext uri="{BB962C8B-B14F-4D97-AF65-F5344CB8AC3E}">
-        <p14:creationId xmlns:p14="http://schemas.microsoft.com/office/powerpoint/2010/main" val="1410814769"/>
-      </p:ext>
-    </p:extLst>
-  </p:cSld>
-  <p:clrMapOvr>
-    <a:masterClrMapping/>
-  </p:clrMapOvr>
-</p:sld>
-</file>
-
-<file path=ppt/slides/slide21.xml><?xml version="1.0" encoding="utf-8"?>
 <p:sld xmlns:a="http://schemas.openxmlformats.org/drawingml/2006/main" xmlns:r="http://schemas.openxmlformats.org/officeDocument/2006/relationships" xmlns:p="http://schemas.openxmlformats.org/presentationml/2006/main">
   <p:cSld>
     <p:bg>
@@ -4549,7 +4472,7 @@
 </p:sld>
 </file>
 
-<file path=ppt/slides/slide22.xml><?xml version="1.0" encoding="utf-8"?>
+<file path=ppt/slides/slide21.xml><?xml version="1.0" encoding="utf-8"?>
 <p:sld xmlns:a="http://schemas.openxmlformats.org/drawingml/2006/main" xmlns:r="http://schemas.openxmlformats.org/officeDocument/2006/relationships" xmlns:p="http://schemas.openxmlformats.org/presentationml/2006/main">
   <p:cSld>
     <p:bg>
@@ -4630,7 +4553,7 @@
 </p:sld>
 </file>
 
-<file path=ppt/slides/slide23.xml><?xml version="1.0" encoding="utf-8"?>
+<file path=ppt/slides/slide22.xml><?xml version="1.0" encoding="utf-8"?>
 <p:sld xmlns:a="http://schemas.openxmlformats.org/drawingml/2006/main" xmlns:r="http://schemas.openxmlformats.org/officeDocument/2006/relationships" xmlns:p="http://schemas.openxmlformats.org/presentationml/2006/main">
   <p:cSld>
     <p:bg>
@@ -4808,7 +4731,7 @@
 </p:sld>
 </file>
 
-<file path=ppt/slides/slide24.xml><?xml version="1.0" encoding="utf-8"?>
+<file path=ppt/slides/slide23.xml><?xml version="1.0" encoding="utf-8"?>
 <p:sld xmlns:a="http://schemas.openxmlformats.org/drawingml/2006/main" xmlns:r="http://schemas.openxmlformats.org/officeDocument/2006/relationships" xmlns:p="http://schemas.openxmlformats.org/presentationml/2006/main">
   <p:cSld>
     <p:bg>
@@ -4921,7 +4844,7 @@
 </p:sld>
 </file>
 
-<file path=ppt/slides/slide25.xml><?xml version="1.0" encoding="utf-8"?>
+<file path=ppt/slides/slide24.xml><?xml version="1.0" encoding="utf-8"?>
 <p:sld xmlns:a="http://schemas.openxmlformats.org/drawingml/2006/main" xmlns:r="http://schemas.openxmlformats.org/officeDocument/2006/relationships" xmlns:p="http://schemas.openxmlformats.org/presentationml/2006/main">
   <p:cSld>
     <p:bg>
@@ -5002,7 +4925,7 @@
 </p:sld>
 </file>
 
-<file path=ppt/slides/slide26.xml><?xml version="1.0" encoding="utf-8"?>
+<file path=ppt/slides/slide25.xml><?xml version="1.0" encoding="utf-8"?>
 <p:sld xmlns:a="http://schemas.openxmlformats.org/drawingml/2006/main" xmlns:r="http://schemas.openxmlformats.org/officeDocument/2006/relationships" xmlns:p="http://schemas.openxmlformats.org/presentationml/2006/main">
   <p:cSld>
     <p:bg>
@@ -5083,7 +5006,7 @@
 </p:sld>
 </file>
 
-<file path=ppt/slides/slide27.xml><?xml version="1.0" encoding="utf-8"?>
+<file path=ppt/slides/slide26.xml><?xml version="1.0" encoding="utf-8"?>
 <p:sld xmlns:a="http://schemas.openxmlformats.org/drawingml/2006/main" xmlns:r="http://schemas.openxmlformats.org/officeDocument/2006/relationships" xmlns:p="http://schemas.openxmlformats.org/presentationml/2006/main">
   <p:cSld>
     <p:bg>
@@ -5164,7 +5087,7 @@
 </p:sld>
 </file>
 
-<file path=ppt/slides/slide28.xml><?xml version="1.0" encoding="utf-8"?>
+<file path=ppt/slides/slide27.xml><?xml version="1.0" encoding="utf-8"?>
 <p:sld xmlns:a="http://schemas.openxmlformats.org/drawingml/2006/main" xmlns:r="http://schemas.openxmlformats.org/officeDocument/2006/relationships" xmlns:p="http://schemas.openxmlformats.org/presentationml/2006/main">
   <p:cSld>
     <p:bg>
@@ -5255,7 +5178,7 @@
 </p:sld>
 </file>
 
-<file path=ppt/slides/slide29.xml><?xml version="1.0" encoding="utf-8"?>
+<file path=ppt/slides/slide28.xml><?xml version="1.0" encoding="utf-8"?>
 <p:sld xmlns:a="http://schemas.openxmlformats.org/drawingml/2006/main" xmlns:r="http://schemas.openxmlformats.org/officeDocument/2006/relationships" xmlns:p="http://schemas.openxmlformats.org/presentationml/2006/main">
   <p:cSld>
     <p:spTree>
@@ -5312,6 +5235,87 @@
     <p:extLst>
       <p:ext uri="{BB962C8B-B14F-4D97-AF65-F5344CB8AC3E}">
         <p14:creationId xmlns:p14="http://schemas.microsoft.com/office/powerpoint/2010/main" val="1283020836"/>
+      </p:ext>
+    </p:extLst>
+  </p:cSld>
+  <p:clrMapOvr>
+    <a:masterClrMapping/>
+  </p:clrMapOvr>
+</p:sld>
+</file>
+
+<file path=ppt/slides/slide29.xml><?xml version="1.0" encoding="utf-8"?>
+<p:sld xmlns:a="http://schemas.openxmlformats.org/drawingml/2006/main" xmlns:r="http://schemas.openxmlformats.org/officeDocument/2006/relationships" xmlns:p="http://schemas.openxmlformats.org/presentationml/2006/main">
+  <p:cSld>
+    <p:bg>
+      <p:bgPr>
+        <a:solidFill>
+          <a:srgbClr val="EBDCB3"/>
+        </a:solidFill>
+        <a:effectLst/>
+      </p:bgPr>
+    </p:bg>
+    <p:spTree>
+      <p:nvGrpSpPr>
+        <p:cNvPr id="1" name="">
+          <a:extLst>
+            <a:ext uri="{FF2B5EF4-FFF2-40B4-BE49-F238E27FC236}">
+              <a16:creationId xmlns:a16="http://schemas.microsoft.com/office/drawing/2014/main" id="{24DDBB4B-6774-DDB0-39B2-340C2C8CB79D}"/>
+            </a:ext>
+          </a:extLst>
+        </p:cNvPr>
+        <p:cNvGrpSpPr/>
+        <p:nvPr/>
+      </p:nvGrpSpPr>
+      <p:grpSpPr>
+        <a:xfrm>
+          <a:off x="0" y="0"/>
+          <a:ext cx="0" cy="0"/>
+          <a:chOff x="0" y="0"/>
+          <a:chExt cx="0" cy="0"/>
+        </a:xfrm>
+      </p:grpSpPr>
+      <p:sp>
+        <p:nvSpPr>
+          <p:cNvPr id="2" name="Title 1">
+            <a:extLst>
+              <a:ext uri="{FF2B5EF4-FFF2-40B4-BE49-F238E27FC236}">
+                <a16:creationId xmlns:a16="http://schemas.microsoft.com/office/drawing/2014/main" id="{B0E4307F-AD34-1B09-21F0-E093349235B9}"/>
+              </a:ext>
+            </a:extLst>
+          </p:cNvPr>
+          <p:cNvSpPr>
+            <a:spLocks noGrp="1"/>
+          </p:cNvSpPr>
+          <p:nvPr>
+            <p:ph type="ctrTitle"/>
+          </p:nvPr>
+        </p:nvSpPr>
+        <p:spPr>
+          <a:xfrm>
+            <a:off x="1524000" y="2743200"/>
+            <a:ext cx="9144000" cy="1193800"/>
+          </a:xfrm>
+        </p:spPr>
+        <p:txBody>
+          <a:bodyPr/>
+          <a:lstStyle/>
+          <a:p>
+            <a:r>
+              <a:rPr lang="en-US" dirty="0">
+                <a:solidFill>
+                  <a:srgbClr val="282828"/>
+                </a:solidFill>
+              </a:rPr>
+              <a:t>Tip: *Talk* to the robot</a:t>
+            </a:r>
+          </a:p>
+        </p:txBody>
+      </p:sp>
+    </p:spTree>
+    <p:extLst>
+      <p:ext uri="{BB962C8B-B14F-4D97-AF65-F5344CB8AC3E}">
+        <p14:creationId xmlns:p14="http://schemas.microsoft.com/office/powerpoint/2010/main" val="3721046854"/>
       </p:ext>
     </p:extLst>
   </p:cSld>
@@ -5534,87 +5538,6 @@
         <p:cNvPr id="1" name="">
           <a:extLst>
             <a:ext uri="{FF2B5EF4-FFF2-40B4-BE49-F238E27FC236}">
-              <a16:creationId xmlns:a16="http://schemas.microsoft.com/office/drawing/2014/main" id="{24DDBB4B-6774-DDB0-39B2-340C2C8CB79D}"/>
-            </a:ext>
-          </a:extLst>
-        </p:cNvPr>
-        <p:cNvGrpSpPr/>
-        <p:nvPr/>
-      </p:nvGrpSpPr>
-      <p:grpSpPr>
-        <a:xfrm>
-          <a:off x="0" y="0"/>
-          <a:ext cx="0" cy="0"/>
-          <a:chOff x="0" y="0"/>
-          <a:chExt cx="0" cy="0"/>
-        </a:xfrm>
-      </p:grpSpPr>
-      <p:sp>
-        <p:nvSpPr>
-          <p:cNvPr id="2" name="Title 1">
-            <a:extLst>
-              <a:ext uri="{FF2B5EF4-FFF2-40B4-BE49-F238E27FC236}">
-                <a16:creationId xmlns:a16="http://schemas.microsoft.com/office/drawing/2014/main" id="{B0E4307F-AD34-1B09-21F0-E093349235B9}"/>
-              </a:ext>
-            </a:extLst>
-          </p:cNvPr>
-          <p:cNvSpPr>
-            <a:spLocks noGrp="1"/>
-          </p:cNvSpPr>
-          <p:nvPr>
-            <p:ph type="ctrTitle"/>
-          </p:nvPr>
-        </p:nvSpPr>
-        <p:spPr>
-          <a:xfrm>
-            <a:off x="1524000" y="2743200"/>
-            <a:ext cx="9144000" cy="1193800"/>
-          </a:xfrm>
-        </p:spPr>
-        <p:txBody>
-          <a:bodyPr/>
-          <a:lstStyle/>
-          <a:p>
-            <a:r>
-              <a:rPr lang="en-US" dirty="0">
-                <a:solidFill>
-                  <a:srgbClr val="282828"/>
-                </a:solidFill>
-              </a:rPr>
-              <a:t>Tip: *Talk* to the robot</a:t>
-            </a:r>
-          </a:p>
-        </p:txBody>
-      </p:sp>
-    </p:spTree>
-    <p:extLst>
-      <p:ext uri="{BB962C8B-B14F-4D97-AF65-F5344CB8AC3E}">
-        <p14:creationId xmlns:p14="http://schemas.microsoft.com/office/powerpoint/2010/main" val="3721046854"/>
-      </p:ext>
-    </p:extLst>
-  </p:cSld>
-  <p:clrMapOvr>
-    <a:masterClrMapping/>
-  </p:clrMapOvr>
-</p:sld>
-</file>
-
-<file path=ppt/slides/slide31.xml><?xml version="1.0" encoding="utf-8"?>
-<p:sld xmlns:a="http://schemas.openxmlformats.org/drawingml/2006/main" xmlns:r="http://schemas.openxmlformats.org/officeDocument/2006/relationships" xmlns:p="http://schemas.openxmlformats.org/presentationml/2006/main">
-  <p:cSld>
-    <p:bg>
-      <p:bgPr>
-        <a:solidFill>
-          <a:srgbClr val="EBDCB3"/>
-        </a:solidFill>
-        <a:effectLst/>
-      </p:bgPr>
-    </p:bg>
-    <p:spTree>
-      <p:nvGrpSpPr>
-        <p:cNvPr id="1" name="">
-          <a:extLst>
-            <a:ext uri="{FF2B5EF4-FFF2-40B4-BE49-F238E27FC236}">
               <a16:creationId xmlns:a16="http://schemas.microsoft.com/office/drawing/2014/main" id="{2B3A2189-D85C-D825-FFA7-C1A173AD519A}"/>
             </a:ext>
           </a:extLst>
@@ -5680,7 +5603,7 @@
 </p:sld>
 </file>
 
-<file path=ppt/slides/slide32.xml><?xml version="1.0" encoding="utf-8"?>
+<file path=ppt/slides/slide31.xml><?xml version="1.0" encoding="utf-8"?>
 <p:sld xmlns:a="http://schemas.openxmlformats.org/drawingml/2006/main" xmlns:r="http://schemas.openxmlformats.org/officeDocument/2006/relationships" xmlns:p="http://schemas.openxmlformats.org/presentationml/2006/main">
   <p:cSld>
     <p:bg>
@@ -5763,7 +5686,7 @@
 </p:sld>
 </file>
 
-<file path=ppt/slides/slide33.xml><?xml version="1.0" encoding="utf-8"?>
+<file path=ppt/slides/slide32.xml><?xml version="1.0" encoding="utf-8"?>
 <p:sld xmlns:a="http://schemas.openxmlformats.org/drawingml/2006/main" xmlns:r="http://schemas.openxmlformats.org/officeDocument/2006/relationships" xmlns:p="http://schemas.openxmlformats.org/presentationml/2006/main">
   <p:cSld>
     <p:bg>
@@ -5846,7 +5769,7 @@
 </p:sld>
 </file>
 
-<file path=ppt/slides/slide34.xml><?xml version="1.0" encoding="utf-8"?>
+<file path=ppt/slides/slide33.xml><?xml version="1.0" encoding="utf-8"?>
 <p:sld xmlns:a="http://schemas.openxmlformats.org/drawingml/2006/main" xmlns:r="http://schemas.openxmlformats.org/officeDocument/2006/relationships" xmlns:p="http://schemas.openxmlformats.org/presentationml/2006/main">
   <p:cSld>
     <p:bg>
@@ -6414,87 +6337,6 @@
     <p:bg>
       <p:bgPr>
         <a:solidFill>
-          <a:srgbClr val="EBDCB3"/>
-        </a:solidFill>
-        <a:effectLst/>
-      </p:bgPr>
-    </p:bg>
-    <p:spTree>
-      <p:nvGrpSpPr>
-        <p:cNvPr id="1" name="">
-          <a:extLst>
-            <a:ext uri="{FF2B5EF4-FFF2-40B4-BE49-F238E27FC236}">
-              <a16:creationId xmlns:a16="http://schemas.microsoft.com/office/drawing/2014/main" id="{9932E6CA-B1AA-C449-7490-ED1E415B353F}"/>
-            </a:ext>
-          </a:extLst>
-        </p:cNvPr>
-        <p:cNvGrpSpPr/>
-        <p:nvPr/>
-      </p:nvGrpSpPr>
-      <p:grpSpPr>
-        <a:xfrm>
-          <a:off x="0" y="0"/>
-          <a:ext cx="0" cy="0"/>
-          <a:chOff x="0" y="0"/>
-          <a:chExt cx="0" cy="0"/>
-        </a:xfrm>
-      </p:grpSpPr>
-      <p:sp>
-        <p:nvSpPr>
-          <p:cNvPr id="2" name="Title 1">
-            <a:extLst>
-              <a:ext uri="{FF2B5EF4-FFF2-40B4-BE49-F238E27FC236}">
-                <a16:creationId xmlns:a16="http://schemas.microsoft.com/office/drawing/2014/main" id="{70665139-7416-8F6F-1DF1-1E15D56CAAE5}"/>
-              </a:ext>
-            </a:extLst>
-          </p:cNvPr>
-          <p:cNvSpPr>
-            <a:spLocks noGrp="1"/>
-          </p:cNvSpPr>
-          <p:nvPr>
-            <p:ph type="ctrTitle"/>
-          </p:nvPr>
-        </p:nvSpPr>
-        <p:spPr>
-          <a:xfrm>
-            <a:off x="1524000" y="2743200"/>
-            <a:ext cx="9144000" cy="1193800"/>
-          </a:xfrm>
-        </p:spPr>
-        <p:txBody>
-          <a:bodyPr/>
-          <a:lstStyle/>
-          <a:p>
-            <a:r>
-              <a:rPr lang="en-US" dirty="0">
-                <a:solidFill>
-                  <a:srgbClr val="282828"/>
-                </a:solidFill>
-              </a:rPr>
-              <a:t>Zero FTEs</a:t>
-            </a:r>
-          </a:p>
-        </p:txBody>
-      </p:sp>
-    </p:spTree>
-    <p:extLst>
-      <p:ext uri="{BB962C8B-B14F-4D97-AF65-F5344CB8AC3E}">
-        <p14:creationId xmlns:p14="http://schemas.microsoft.com/office/powerpoint/2010/main" val="2678142555"/>
-      </p:ext>
-    </p:extLst>
-  </p:cSld>
-  <p:clrMapOvr>
-    <a:masterClrMapping/>
-  </p:clrMapOvr>
-</p:sld>
-</file>
-
-<file path=ppt/slides/slide9.xml><?xml version="1.0" encoding="utf-8"?>
-<p:sld xmlns:a="http://schemas.openxmlformats.org/drawingml/2006/main" xmlns:r="http://schemas.openxmlformats.org/officeDocument/2006/relationships" xmlns:p="http://schemas.openxmlformats.org/presentationml/2006/main">
-  <p:cSld>
-    <p:bg>
-      <p:bgPr>
-        <a:solidFill>
           <a:srgbClr val="282828"/>
         </a:solidFill>
         <a:effectLst/>
@@ -6590,6 +6432,87 @@
     <p:extLst>
       <p:ext uri="{BB962C8B-B14F-4D97-AF65-F5344CB8AC3E}">
         <p14:creationId xmlns:p14="http://schemas.microsoft.com/office/powerpoint/2010/main" val="2326516040"/>
+      </p:ext>
+    </p:extLst>
+  </p:cSld>
+  <p:clrMapOvr>
+    <a:masterClrMapping/>
+  </p:clrMapOvr>
+</p:sld>
+</file>
+
+<file path=ppt/slides/slide9.xml><?xml version="1.0" encoding="utf-8"?>
+<p:sld xmlns:a="http://schemas.openxmlformats.org/drawingml/2006/main" xmlns:r="http://schemas.openxmlformats.org/officeDocument/2006/relationships" xmlns:p="http://schemas.openxmlformats.org/presentationml/2006/main">
+  <p:cSld>
+    <p:bg>
+      <p:bgPr>
+        <a:solidFill>
+          <a:srgbClr val="EBDCB3"/>
+        </a:solidFill>
+        <a:effectLst/>
+      </p:bgPr>
+    </p:bg>
+    <p:spTree>
+      <p:nvGrpSpPr>
+        <p:cNvPr id="1" name="">
+          <a:extLst>
+            <a:ext uri="{FF2B5EF4-FFF2-40B4-BE49-F238E27FC236}">
+              <a16:creationId xmlns:a16="http://schemas.microsoft.com/office/drawing/2014/main" id="{C9D6A0D5-C35A-E0CF-1111-A3621EC633CD}"/>
+            </a:ext>
+          </a:extLst>
+        </p:cNvPr>
+        <p:cNvGrpSpPr/>
+        <p:nvPr/>
+      </p:nvGrpSpPr>
+      <p:grpSpPr>
+        <a:xfrm>
+          <a:off x="0" y="0"/>
+          <a:ext cx="0" cy="0"/>
+          <a:chOff x="0" y="0"/>
+          <a:chExt cx="0" cy="0"/>
+        </a:xfrm>
+      </p:grpSpPr>
+      <p:sp>
+        <p:nvSpPr>
+          <p:cNvPr id="2" name="Title 1">
+            <a:extLst>
+              <a:ext uri="{FF2B5EF4-FFF2-40B4-BE49-F238E27FC236}">
+                <a16:creationId xmlns:a16="http://schemas.microsoft.com/office/drawing/2014/main" id="{02E84A37-4069-093C-5790-996E9EBFF7D3}"/>
+              </a:ext>
+            </a:extLst>
+          </p:cNvPr>
+          <p:cNvSpPr>
+            <a:spLocks noGrp="1"/>
+          </p:cNvSpPr>
+          <p:nvPr>
+            <p:ph type="ctrTitle"/>
+          </p:nvPr>
+        </p:nvSpPr>
+        <p:spPr>
+          <a:xfrm>
+            <a:off x="1524000" y="2743200"/>
+            <a:ext cx="9144000" cy="1193800"/>
+          </a:xfrm>
+        </p:spPr>
+        <p:txBody>
+          <a:bodyPr/>
+          <a:lstStyle/>
+          <a:p>
+            <a:r>
+              <a:rPr lang="en-US" dirty="0">
+                <a:solidFill>
+                  <a:srgbClr val="282828"/>
+                </a:solidFill>
+              </a:rPr>
+              <a:t>The system is empowered:</a:t>
+            </a:r>
+          </a:p>
+        </p:txBody>
+      </p:sp>
+    </p:spTree>
+    <p:extLst>
+      <p:ext uri="{BB962C8B-B14F-4D97-AF65-F5344CB8AC3E}">
+        <p14:creationId xmlns:p14="http://schemas.microsoft.com/office/powerpoint/2010/main" val="3096382915"/>
       </p:ext>
     </p:extLst>
   </p:cSld>

</xml_diff>

<commit_message>
Clean up and sanitize presentation files
Performed file cleanup and sanitization across all presentation formats.

Co-Authored-By: Claude Sonnet 4.5 <noreply@anthropic.com>
</commit_message>
<xml_diff>
--- a/Agentic_Threat_Intel/2026-01-21_Agentic-Threat-Intel-Presentation.pptx
+++ b/Agentic_Threat_Intel/2026-01-21_Agentic-Threat-Intel-Presentation.pptx
@@ -3384,7 +3384,7 @@
         </p:nvSpPr>
         <p:spPr>
           <a:xfrm>
-            <a:off x="257432" y="3126260"/>
+            <a:off x="257432" y="2832100"/>
             <a:ext cx="11677135" cy="1193800"/>
           </a:xfrm>
         </p:spPr>
@@ -3776,7 +3776,7 @@
               <a:t>So I built </a:t>
             </a:r>
             <a:r>
-              <a:rPr lang="en-US" i="1" dirty="0">
+              <a:rPr lang="en-US" b="1" i="1" dirty="0">
                 <a:solidFill>
                   <a:srgbClr val="EBDCB3"/>
                 </a:solidFill>
@@ -4116,6 +4116,144 @@
           </a:prstGeom>
         </p:spPr>
       </p:pic>
+      <p:sp>
+        <p:nvSpPr>
+          <p:cNvPr id="2" name="Rectangle 1">
+            <a:extLst>
+              <a:ext uri="{FF2B5EF4-FFF2-40B4-BE49-F238E27FC236}">
+                <a16:creationId xmlns:a16="http://schemas.microsoft.com/office/drawing/2014/main" id="{0BC0792D-D908-94DE-8A07-7A5F3E15625F}"/>
+              </a:ext>
+            </a:extLst>
+          </p:cNvPr>
+          <p:cNvSpPr/>
+          <p:nvPr/>
+        </p:nvSpPr>
+        <p:spPr>
+          <a:xfrm>
+            <a:off x="1552353" y="4572000"/>
+            <a:ext cx="797442" cy="276447"/>
+          </a:xfrm>
+          <a:prstGeom prst="rect">
+            <a:avLst/>
+          </a:prstGeom>
+        </p:spPr>
+        <p:style>
+          <a:lnRef idx="2">
+            <a:schemeClr val="accent1">
+              <a:shade val="15000"/>
+            </a:schemeClr>
+          </a:lnRef>
+          <a:fillRef idx="1">
+            <a:schemeClr val="accent1"/>
+          </a:fillRef>
+          <a:effectRef idx="0">
+            <a:schemeClr val="accent1"/>
+          </a:effectRef>
+          <a:fontRef idx="minor">
+            <a:schemeClr val="lt1"/>
+          </a:fontRef>
+        </p:style>
+        <p:txBody>
+          <a:bodyPr rtlCol="0" anchor="ctr"/>
+          <a:lstStyle/>
+          <a:p>
+            <a:pPr algn="ctr"/>
+            <a:endParaRPr lang="en-US"/>
+          </a:p>
+        </p:txBody>
+      </p:sp>
+      <p:sp>
+        <p:nvSpPr>
+          <p:cNvPr id="4" name="Rectangle 3">
+            <a:extLst>
+              <a:ext uri="{FF2B5EF4-FFF2-40B4-BE49-F238E27FC236}">
+                <a16:creationId xmlns:a16="http://schemas.microsoft.com/office/drawing/2014/main" id="{A058D9A4-02B8-49F9-5AF2-15DA82862030}"/>
+              </a:ext>
+            </a:extLst>
+          </p:cNvPr>
+          <p:cNvSpPr/>
+          <p:nvPr/>
+        </p:nvSpPr>
+        <p:spPr>
+          <a:xfrm>
+            <a:off x="1201479" y="1318437"/>
+            <a:ext cx="1520456" cy="297712"/>
+          </a:xfrm>
+          <a:prstGeom prst="rect">
+            <a:avLst/>
+          </a:prstGeom>
+        </p:spPr>
+        <p:style>
+          <a:lnRef idx="2">
+            <a:schemeClr val="accent1">
+              <a:shade val="15000"/>
+            </a:schemeClr>
+          </a:lnRef>
+          <a:fillRef idx="1">
+            <a:schemeClr val="accent1"/>
+          </a:fillRef>
+          <a:effectRef idx="0">
+            <a:schemeClr val="accent1"/>
+          </a:effectRef>
+          <a:fontRef idx="minor">
+            <a:schemeClr val="lt1"/>
+          </a:fontRef>
+        </p:style>
+        <p:txBody>
+          <a:bodyPr rtlCol="0" anchor="ctr"/>
+          <a:lstStyle/>
+          <a:p>
+            <a:pPr algn="ctr"/>
+            <a:endParaRPr lang="en-US"/>
+          </a:p>
+        </p:txBody>
+      </p:sp>
+      <p:sp>
+        <p:nvSpPr>
+          <p:cNvPr id="5" name="Rectangle 4">
+            <a:extLst>
+              <a:ext uri="{FF2B5EF4-FFF2-40B4-BE49-F238E27FC236}">
+                <a16:creationId xmlns:a16="http://schemas.microsoft.com/office/drawing/2014/main" id="{85944ECC-B14E-AF8E-D7FD-90756C47A5E6}"/>
+              </a:ext>
+            </a:extLst>
+          </p:cNvPr>
+          <p:cNvSpPr/>
+          <p:nvPr/>
+        </p:nvSpPr>
+        <p:spPr>
+          <a:xfrm>
+            <a:off x="4423144" y="1318437"/>
+            <a:ext cx="956930" cy="297712"/>
+          </a:xfrm>
+          <a:prstGeom prst="rect">
+            <a:avLst/>
+          </a:prstGeom>
+        </p:spPr>
+        <p:style>
+          <a:lnRef idx="2">
+            <a:schemeClr val="accent1">
+              <a:shade val="15000"/>
+            </a:schemeClr>
+          </a:lnRef>
+          <a:fillRef idx="1">
+            <a:schemeClr val="accent1"/>
+          </a:fillRef>
+          <a:effectRef idx="0">
+            <a:schemeClr val="accent1"/>
+          </a:effectRef>
+          <a:fontRef idx="minor">
+            <a:schemeClr val="lt1"/>
+          </a:fontRef>
+        </p:style>
+        <p:txBody>
+          <a:bodyPr rtlCol="0" anchor="ctr"/>
+          <a:lstStyle/>
+          <a:p>
+            <a:pPr algn="ctr"/>
+            <a:endParaRPr lang="en-US"/>
+          </a:p>
+        </p:txBody>
+      </p:sp>
     </p:spTree>
     <p:extLst>
       <p:ext uri="{BB962C8B-B14F-4D97-AF65-F5344CB8AC3E}">
@@ -5746,12 +5884,20 @@
           <a:lstStyle/>
           <a:p>
             <a:r>
+              <a:rPr lang="en-US" b="1" i="1" dirty="0">
+                <a:solidFill>
+                  <a:srgbClr val="282828"/>
+                </a:solidFill>
+              </a:rPr>
+              <a:t>You</a:t>
+            </a:r>
+            <a:r>
               <a:rPr lang="en-US" dirty="0">
                 <a:solidFill>
                   <a:srgbClr val="282828"/>
                 </a:solidFill>
               </a:rPr>
-              <a:t>You own the outcome</a:t>
+              <a:t> own the outcome</a:t>
             </a:r>
           </a:p>
         </p:txBody>

</xml_diff>